<commit_message>
Make ppt site text larger
</commit_message>
<xml_diff>
--- a/Samantha_Ming_PPTX_PC.pptx
+++ b/Samantha_Ming_PPTX_PC.pptx
@@ -4774,12 +4774,16 @@
                 <a:ea typeface="Avenir Book"/>
                 <a:cs typeface="Avenir Book"/>
                 <a:sym typeface="Avenir Book"/>
+                <a:hlinkClick r:id="rId4" invalidUrl="" action="" tgtFrame="" tooltip="" history="1" highlightClick="0" endSnd="0"/>
               </a:defRPr>
             </a:lvl1pPr>
           </a:lstStyle>
           <a:p>
             <a:pPr/>
             <a:r>
+              <a:rPr>
+                <a:hlinkClick r:id="rId4" invalidUrl="" action="" tgtFrame="" tooltip="" history="1" highlightClick="0" endSnd="0"/>
+              </a:rPr>
               <a:t>samantha_ming</a:t>
             </a:r>
           </a:p>
@@ -4794,7 +4798,7 @@
           <p:nvPr/>
         </p:nvPicPr>
         <p:blipFill>
-          <a:blip r:embed="rId4">
+          <a:blip r:embed="rId5">
             <a:extLst/>
           </a:blip>
           <a:stretch>
@@ -4851,12 +4855,16 @@
                 <a:ea typeface="Avenir Book"/>
                 <a:cs typeface="Avenir Book"/>
                 <a:sym typeface="Avenir Book"/>
+                <a:hlinkClick r:id="rId6" invalidUrl="" action="" tgtFrame="" tooltip="" history="1" highlightClick="0" endSnd="0"/>
               </a:defRPr>
             </a:lvl1pPr>
           </a:lstStyle>
           <a:p>
             <a:pPr/>
             <a:r>
+              <a:rPr>
+                <a:hlinkClick r:id="rId6" invalidUrl="" action="" tgtFrame="" tooltip="" history="1" highlightClick="0" endSnd="0"/>
+              </a:rPr>
               <a:t>samanthaming</a:t>
             </a:r>
           </a:p>
@@ -4988,8 +4996,8 @@
         </p:nvSpPr>
         <p:spPr>
           <a:xfrm>
-            <a:off x="3383634" y="8742371"/>
-            <a:ext cx="4691381" cy="800101"/>
+            <a:off x="2811499" y="8742760"/>
+            <a:ext cx="5835651" cy="965201"/>
           </a:xfrm>
           <a:prstGeom prst="rect">
             <a:avLst/>
@@ -5009,7 +5017,7 @@
           </a:bodyPr>
           <a:lstStyle>
             <a:lvl1pPr>
-              <a:defRPr sz="4000">
+              <a:defRPr sz="5000">
                 <a:solidFill>
                   <a:srgbClr val="A6AAA9"/>
                 </a:solidFill>
@@ -5037,7 +5045,7 @@
           <p:nvPr/>
         </p:nvPicPr>
         <p:blipFill>
-          <a:blip r:embed="rId5">
+          <a:blip r:embed="rId7">
             <a:extLst/>
           </a:blip>
           <a:stretch>
@@ -5094,12 +5102,16 @@
                 <a:ea typeface="Avenir Book"/>
                 <a:cs typeface="Avenir Book"/>
                 <a:sym typeface="Avenir Book"/>
+                <a:hlinkClick r:id="rId8" invalidUrl="" action="" tgtFrame="" tooltip="" history="1" highlightClick="0" endSnd="0"/>
               </a:defRPr>
             </a:lvl1pPr>
           </a:lstStyle>
           <a:p>
             <a:pPr/>
             <a:r>
+              <a:rPr>
+                <a:hlinkClick r:id="rId8" invalidUrl="" action="" tgtFrame="" tooltip="" history="1" highlightClick="0" endSnd="0"/>
+              </a:rPr>
               <a:t>samanthaming</a:t>
             </a:r>
           </a:p>

</xml_diff>